<commit_message>
updating formatting for meditation and yoga pages, added meditation ul to html and guide users through practice, added demo image for read me, updated power point slides, refined read me info to meet project criteria
</commit_message>
<xml_diff>
--- a/Assets/NYSlides.pptx
+++ b/Assets/NYSlides.pptx
@@ -110,6 +110,11 @@
       </a:defRPr>
     </a:lvl9pPr>
   </p:defaultTextStyle>
+  <p:extLst>
+    <p:ext uri="{EFAFB233-063F-42B5-8137-9DF3F51BA10A}">
+      <p15:sldGuideLst xmlns:p15="http://schemas.microsoft.com/office/powerpoint/2012/main"/>
+    </p:ext>
+  </p:extLst>
 </p:presentation>
 </file>
 
@@ -6076,17 +6081,13 @@
         <p:spPr/>
         <p:txBody>
           <a:bodyPr vert="horz" lIns="91440" tIns="45720" rIns="91440" bIns="45720" rtlCol="0">
-            <a:normAutofit lnSpcReduction="10000"/>
+            <a:normAutofit fontScale="85000" lnSpcReduction="20000"/>
           </a:bodyPr>
           <a:lstStyle/>
           <a:p>
             <a:r>
-              <a:rPr lang="en-US" dirty="0" err="1"/>
-              <a:t>Desription</a:t>
-            </a:r>
-            <a:r>
               <a:rPr lang="en-US" dirty="0"/>
-              <a:t> - </a:t>
+              <a:t>Description - </a:t>
             </a:r>
             <a:r>
               <a:rPr lang="en-US" dirty="0" err="1"/>
@@ -6124,19 +6125,32 @@
           <a:p>
             <a:r>
               <a:rPr lang="en-US" dirty="0"/>
-              <a:t>Motivation for Development </a:t>
-            </a:r>
-          </a:p>
-          <a:p>
+              <a:t>User Story - </a:t>
+            </a:r>
+            <a:r>
+              <a:rPr lang="en-US" dirty="0" err="1"/>
+              <a:t>NamasteYogi</a:t>
+            </a:r>
             <a:r>
               <a:rPr lang="en-US" dirty="0"/>
-              <a:t>User Story</a:t>
-            </a:r>
-          </a:p>
-          <a:p>
+              <a:t> is for the yogi who has just a little too much on </a:t>
+            </a:r>
+            <a:r>
+              <a:rPr lang="en-US" dirty="0" err="1"/>
+              <a:t>thier</a:t>
+            </a:r>
             <a:r>
               <a:rPr lang="en-US" dirty="0"/>
-              <a:t>Concept: What is your user story? What was your motivation for development?</a:t>
+              <a:t> to do list.  Clients input problem areas or share how they are feeling, the app offers yoga postures, meditation, and/or breath work easily incorporated into each day. </a:t>
+            </a:r>
+          </a:p>
+          <a:p>
+            <a:endParaRPr lang="en-US" dirty="0"/>
+          </a:p>
+          <a:p>
+            <a:r>
+              <a:rPr lang="en-US" dirty="0"/>
+              <a:t>Motivation for development – balancing it all is not easy, I think we’re all feeling the crunch.  We wanted to be solution oriented and offer something we could all use…</a:t>
             </a:r>
           </a:p>
           <a:p>
@@ -6221,7 +6235,7 @@
         <p:spPr/>
         <p:txBody>
           <a:bodyPr>
-            <a:normAutofit fontScale="85000" lnSpcReduction="20000"/>
+            <a:normAutofit/>
           </a:bodyPr>
           <a:lstStyle/>
           <a:p>
@@ -6279,23 +6293,25 @@
           <a:p>
             <a:r>
               <a:rPr lang="en-US" dirty="0"/>
-              <a:t>Challenges</a:t>
+              <a:t>Challenges we encountered – APIs…………………..</a:t>
             </a:r>
           </a:p>
           <a:p>
             <a:r>
               <a:rPr lang="en-US" dirty="0"/>
-              <a:t>Successes</a:t>
+              <a:t>Successes – great team work, we learned from </a:t>
+            </a:r>
+            <a:r>
+              <a:rPr lang="en-US" dirty="0" err="1"/>
+              <a:t>eachother</a:t>
+            </a:r>
+            <a:r>
+              <a:rPr lang="en-US" dirty="0"/>
+              <a:t>….</a:t>
             </a:r>
           </a:p>
           <a:p>
             <a:endParaRPr lang="en-US" dirty="0"/>
-          </a:p>
-          <a:p>
-            <a:r>
-              <a:rPr lang="en-US" dirty="0"/>
-              <a:t>* Process: What were the technologies used? How were tasks and roles broken down and assigned? What challenges did you encounter? What were your successes?</a:t>
-            </a:r>
           </a:p>
           <a:p>
             <a:endParaRPr lang="en-US" dirty="0"/>
@@ -6356,8 +6372,8 @@
         </p:nvSpPr>
         <p:spPr>
           <a:xfrm>
-            <a:off x="-1" y="2766218"/>
-            <a:ext cx="12201525" cy="1325563"/>
+            <a:off x="-1" y="123189"/>
+            <a:ext cx="12201525" cy="1134112"/>
           </a:xfrm>
         </p:spPr>
         <p:txBody>
@@ -6372,6 +6388,65 @@
           </a:p>
         </p:txBody>
       </p:sp>
+      <p:pic>
+        <p:nvPicPr>
+          <p:cNvPr id="3" name="Picture 2">
+            <a:extLst>
+              <a:ext uri="{FF2B5EF4-FFF2-40B4-BE49-F238E27FC236}">
+                <a16:creationId xmlns:a16="http://schemas.microsoft.com/office/drawing/2014/main" id="{EECB1CB3-23D0-434B-A522-51B8E3BBC461}"/>
+              </a:ext>
+            </a:extLst>
+          </p:cNvPr>
+          <p:cNvPicPr>
+            <a:picLocks noChangeAspect="1"/>
+          </p:cNvPicPr>
+          <p:nvPr/>
+        </p:nvPicPr>
+        <p:blipFill>
+          <a:blip r:embed="rId2"/>
+          <a:stretch>
+            <a:fillRect/>
+          </a:stretch>
+        </p:blipFill>
+        <p:spPr>
+          <a:xfrm>
+            <a:off x="288369" y="895986"/>
+            <a:ext cx="1709261" cy="3695700"/>
+          </a:xfrm>
+          <a:prstGeom prst="rect">
+            <a:avLst/>
+          </a:prstGeom>
+        </p:spPr>
+      </p:pic>
+      <p:pic>
+        <p:nvPicPr>
+          <p:cNvPr id="5" name="Picture 4">
+            <a:extLst>
+              <a:ext uri="{FF2B5EF4-FFF2-40B4-BE49-F238E27FC236}">
+                <a16:creationId xmlns:a16="http://schemas.microsoft.com/office/drawing/2014/main" id="{02E60B1C-3DE9-4C71-AD5C-9F72E0389F07}"/>
+              </a:ext>
+            </a:extLst>
+          </p:cNvPr>
+          <p:cNvPicPr>
+            <a:picLocks noChangeAspect="1"/>
+          </p:cNvPicPr>
+          <p:nvPr/>
+        </p:nvPicPr>
+        <p:blipFill rotWithShape="1">
+          <a:blip r:embed="rId3"/>
+          <a:srcRect l="1899" r="886" b="1356"/>
+          <a:stretch/>
+        </p:blipFill>
+        <p:spPr>
+          <a:xfrm>
+            <a:off x="2152650" y="1543688"/>
+            <a:ext cx="9925050" cy="4942838"/>
+          </a:xfrm>
+          <a:prstGeom prst="rect">
+            <a:avLst/>
+          </a:prstGeom>
+        </p:spPr>
+      </p:pic>
     </p:spTree>
     <p:extLst>
       <p:ext uri="{BB962C8B-B14F-4D97-AF65-F5344CB8AC3E}">
@@ -6451,6 +6526,59 @@
           <a:bodyPr/>
           <a:lstStyle/>
           <a:p>
+            <a:r>
+              <a:rPr lang="en-US" dirty="0"/>
+              <a:t>Anatomical model with clickable body parts</a:t>
+            </a:r>
+          </a:p>
+          <a:p>
+            <a:pPr lvl="1"/>
+            <a:r>
+              <a:rPr lang="en-US" dirty="0"/>
+              <a:t>Users target problem areas </a:t>
+            </a:r>
+          </a:p>
+          <a:p>
+            <a:pPr lvl="1"/>
+            <a:r>
+              <a:rPr lang="en-US" dirty="0"/>
+              <a:t>Each body section linked to specific poses</a:t>
+            </a:r>
+          </a:p>
+          <a:p>
+            <a:pPr lvl="1"/>
+            <a:r>
+              <a:rPr lang="en-US" dirty="0"/>
+              <a:t>Upon click, series of poses are offered</a:t>
+            </a:r>
+          </a:p>
+          <a:p>
+            <a:r>
+              <a:rPr lang="en-US" dirty="0"/>
+              <a:t>Music library for mediation practice</a:t>
+            </a:r>
+          </a:p>
+          <a:p>
+            <a:r>
+              <a:rPr lang="en-US" dirty="0"/>
+              <a:t>Visual breath queues</a:t>
+            </a:r>
+          </a:p>
+          <a:p>
+            <a:r>
+              <a:rPr lang="en-US" dirty="0"/>
+              <a:t>Essential Oil &amp; Candle Scent </a:t>
+            </a:r>
+            <a:r>
+              <a:rPr lang="en-US" dirty="0" err="1"/>
+              <a:t>Pairin</a:t>
+            </a:r>
+            <a:endParaRPr lang="en-US" dirty="0"/>
+          </a:p>
+          <a:p>
+            <a:pPr marL="0" indent="0">
+              <a:buNone/>
+            </a:pPr>
             <a:endParaRPr lang="en-US" dirty="0"/>
           </a:p>
         </p:txBody>

</xml_diff>

<commit_message>
team meeting updates - read me, meditation html, css to try to fix background issue, asset folder power point slides
</commit_message>
<xml_diff>
--- a/Assets/NYSlides.pptx
+++ b/Assets/NYSlides.pptx
@@ -314,7 +314,7 @@
           <a:p>
             <a:fld id="{2A369EBE-48DC-4DBC-B75C-45CA0BD2AAF6}" type="datetimeFigureOut">
               <a:rPr lang="en-US" smtClean="0"/>
-              <a:t>12/29/2020</a:t>
+              <a:t>1/2/2021</a:t>
             </a:fld>
             <a:endParaRPr lang="en-US"/>
           </a:p>
@@ -595,7 +595,7 @@
           <a:p>
             <a:fld id="{2A369EBE-48DC-4DBC-B75C-45CA0BD2AAF6}" type="datetimeFigureOut">
               <a:rPr lang="en-US" smtClean="0"/>
-              <a:t>12/29/2020</a:t>
+              <a:t>1/2/2021</a:t>
             </a:fld>
             <a:endParaRPr lang="en-US"/>
           </a:p>
@@ -787,7 +787,7 @@
           <a:p>
             <a:fld id="{2A369EBE-48DC-4DBC-B75C-45CA0BD2AAF6}" type="datetimeFigureOut">
               <a:rPr lang="en-US" smtClean="0"/>
-              <a:t>12/29/2020</a:t>
+              <a:t>1/2/2021</a:t>
             </a:fld>
             <a:endParaRPr lang="en-US"/>
           </a:p>
@@ -1048,7 +1048,7 @@
           <a:p>
             <a:fld id="{2A369EBE-48DC-4DBC-B75C-45CA0BD2AAF6}" type="datetimeFigureOut">
               <a:rPr lang="en-US" smtClean="0"/>
-              <a:t>12/29/2020</a:t>
+              <a:t>1/2/2021</a:t>
             </a:fld>
             <a:endParaRPr lang="en-US"/>
           </a:p>
@@ -1474,7 +1474,7 @@
           <a:p>
             <a:fld id="{2A369EBE-48DC-4DBC-B75C-45CA0BD2AAF6}" type="datetimeFigureOut">
               <a:rPr lang="en-US" smtClean="0"/>
-              <a:t>12/29/2020</a:t>
+              <a:t>1/2/2021</a:t>
             </a:fld>
             <a:endParaRPr lang="en-US"/>
           </a:p>
@@ -2020,7 +2020,7 @@
           <a:p>
             <a:fld id="{2A369EBE-48DC-4DBC-B75C-45CA0BD2AAF6}" type="datetimeFigureOut">
               <a:rPr lang="en-US" smtClean="0"/>
-              <a:t>12/29/2020</a:t>
+              <a:t>1/2/2021</a:t>
             </a:fld>
             <a:endParaRPr lang="en-US"/>
           </a:p>
@@ -2851,7 +2851,7 @@
           <a:p>
             <a:fld id="{2A369EBE-48DC-4DBC-B75C-45CA0BD2AAF6}" type="datetimeFigureOut">
               <a:rPr lang="en-US" smtClean="0"/>
-              <a:t>12/29/2020</a:t>
+              <a:t>1/2/2021</a:t>
             </a:fld>
             <a:endParaRPr lang="en-US"/>
           </a:p>
@@ -3021,7 +3021,7 @@
           <a:p>
             <a:fld id="{2A369EBE-48DC-4DBC-B75C-45CA0BD2AAF6}" type="datetimeFigureOut">
               <a:rPr lang="en-US" smtClean="0"/>
-              <a:t>12/29/2020</a:t>
+              <a:t>1/2/2021</a:t>
             </a:fld>
             <a:endParaRPr lang="en-US"/>
           </a:p>
@@ -3201,7 +3201,7 @@
           <a:p>
             <a:fld id="{2A369EBE-48DC-4DBC-B75C-45CA0BD2AAF6}" type="datetimeFigureOut">
               <a:rPr lang="en-US" smtClean="0"/>
-              <a:t>12/29/2020</a:t>
+              <a:t>1/2/2021</a:t>
             </a:fld>
             <a:endParaRPr lang="en-US"/>
           </a:p>
@@ -3371,7 +3371,7 @@
           <a:p>
             <a:fld id="{2A369EBE-48DC-4DBC-B75C-45CA0BD2AAF6}" type="datetimeFigureOut">
               <a:rPr lang="en-US" smtClean="0"/>
-              <a:t>12/29/2020</a:t>
+              <a:t>1/2/2021</a:t>
             </a:fld>
             <a:endParaRPr lang="en-US"/>
           </a:p>
@@ -3628,7 +3628,7 @@
           <a:p>
             <a:fld id="{2A369EBE-48DC-4DBC-B75C-45CA0BD2AAF6}" type="datetimeFigureOut">
               <a:rPr lang="en-US" smtClean="0"/>
-              <a:t>12/29/2020</a:t>
+              <a:t>1/2/2021</a:t>
             </a:fld>
             <a:endParaRPr lang="en-US"/>
           </a:p>
@@ -3860,7 +3860,7 @@
           <a:p>
             <a:fld id="{2A369EBE-48DC-4DBC-B75C-45CA0BD2AAF6}" type="datetimeFigureOut">
               <a:rPr lang="en-US" smtClean="0"/>
-              <a:t>12/29/2020</a:t>
+              <a:t>1/2/2021</a:t>
             </a:fld>
             <a:endParaRPr lang="en-US"/>
           </a:p>
@@ -4253,7 +4253,7 @@
           <a:p>
             <a:fld id="{2A369EBE-48DC-4DBC-B75C-45CA0BD2AAF6}" type="datetimeFigureOut">
               <a:rPr lang="en-US" smtClean="0"/>
-              <a:t>12/29/2020</a:t>
+              <a:t>1/2/2021</a:t>
             </a:fld>
             <a:endParaRPr lang="en-US"/>
           </a:p>
@@ -4371,7 +4371,7 @@
           <a:p>
             <a:fld id="{2A369EBE-48DC-4DBC-B75C-45CA0BD2AAF6}" type="datetimeFigureOut">
               <a:rPr lang="en-US" smtClean="0"/>
-              <a:t>12/29/2020</a:t>
+              <a:t>1/2/2021</a:t>
             </a:fld>
             <a:endParaRPr lang="en-US"/>
           </a:p>
@@ -4466,7 +4466,7 @@
           <a:p>
             <a:fld id="{2A369EBE-48DC-4DBC-B75C-45CA0BD2AAF6}" type="datetimeFigureOut">
               <a:rPr lang="en-US" smtClean="0"/>
-              <a:t>12/29/2020</a:t>
+              <a:t>1/2/2021</a:t>
             </a:fld>
             <a:endParaRPr lang="en-US"/>
           </a:p>
@@ -4739,7 +4739,7 @@
           <a:p>
             <a:fld id="{2A369EBE-48DC-4DBC-B75C-45CA0BD2AAF6}" type="datetimeFigureOut">
               <a:rPr lang="en-US" smtClean="0"/>
-              <a:t>12/29/2020</a:t>
+              <a:t>1/2/2021</a:t>
             </a:fld>
             <a:endParaRPr lang="en-US"/>
           </a:p>
@@ -5020,7 +5020,7 @@
           <a:p>
             <a:fld id="{2A369EBE-48DC-4DBC-B75C-45CA0BD2AAF6}" type="datetimeFigureOut">
               <a:rPr lang="en-US" smtClean="0"/>
-              <a:t>12/29/2020</a:t>
+              <a:t>1/2/2021</a:t>
             </a:fld>
             <a:endParaRPr lang="en-US"/>
           </a:p>
@@ -5260,7 +5260,7 @@
           <a:p>
             <a:fld id="{2A369EBE-48DC-4DBC-B75C-45CA0BD2AAF6}" type="datetimeFigureOut">
               <a:rPr lang="en-US" smtClean="0"/>
-              <a:t>12/29/2020</a:t>
+              <a:t>1/2/2021</a:t>
             </a:fld>
             <a:endParaRPr lang="en-US"/>
           </a:p>
@@ -5875,7 +5875,7 @@
         </p:nvSpPr>
         <p:spPr>
           <a:xfrm>
-            <a:off x="1688355" y="2867025"/>
+            <a:off x="6165105" y="3219450"/>
             <a:ext cx="4112370" cy="2724150"/>
           </a:xfrm>
         </p:spPr>
@@ -5999,7 +5999,7 @@
           <a:p>
             <a:r>
               <a:rPr lang="en-US" dirty="0"/>
-              <a:t>* Elevator pitch: a one minute description of your application</a:t>
+              <a:t>Let us tell you why you need this app!</a:t>
             </a:r>
           </a:p>
         </p:txBody>
@@ -6081,13 +6081,16 @@
         <p:spPr/>
         <p:txBody>
           <a:bodyPr vert="horz" lIns="91440" tIns="45720" rIns="91440" bIns="45720" rtlCol="0">
-            <a:normAutofit fontScale="85000" lnSpcReduction="20000"/>
+            <a:normAutofit fontScale="77500" lnSpcReduction="20000"/>
           </a:bodyPr>
           <a:lstStyle/>
           <a:p>
+            <a:pPr marL="0" indent="0">
+              <a:buNone/>
+            </a:pPr>
             <a:r>
               <a:rPr lang="en-US" dirty="0"/>
-              <a:t>Description - </a:t>
+              <a:t>Description:  </a:t>
             </a:r>
             <a:r>
               <a:rPr lang="en-US" dirty="0" err="1"/>
@@ -6109,6 +6112,13 @@
             <a:pPr lvl="1"/>
             <a:r>
               <a:rPr lang="en-US" dirty="0"/>
+              <a:t>Click saved poses to practice again later</a:t>
+            </a:r>
+          </a:p>
+          <a:p>
+            <a:pPr lvl="1"/>
+            <a:r>
+              <a:rPr lang="en-US" dirty="0"/>
               <a:t>Finds a studio near you</a:t>
             </a:r>
           </a:p>
@@ -6123,34 +6133,68 @@
             <a:endParaRPr lang="en-US" dirty="0"/>
           </a:p>
           <a:p>
+            <a:pPr marL="0" indent="0">
+              <a:buNone/>
+            </a:pPr>
             <a:r>
               <a:rPr lang="en-US" dirty="0"/>
-              <a:t>User Story - </a:t>
+              <a:t>User Story:  </a:t>
+            </a:r>
+          </a:p>
+          <a:p>
+            <a:pPr lvl="1"/>
+            <a:r>
+              <a:rPr lang="en-US" dirty="0"/>
+              <a:t>As a overwhelmed human</a:t>
+            </a:r>
+          </a:p>
+          <a:p>
+            <a:pPr lvl="1"/>
+            <a:r>
+              <a:rPr lang="en-US" dirty="0"/>
+              <a:t>I want a quick way to add </a:t>
             </a:r>
             <a:r>
               <a:rPr lang="en-US" dirty="0" err="1"/>
-              <a:t>NamasteYogi</a:t>
+              <a:t>zen</a:t>
             </a:r>
             <a:r>
               <a:rPr lang="en-US" dirty="0"/>
-              <a:t> is for the yogi who has just a little too much on </a:t>
-            </a:r>
-            <a:r>
-              <a:rPr lang="en-US" dirty="0" err="1"/>
-              <a:t>thier</a:t>
-            </a:r>
+              <a:t> to my day</a:t>
+            </a:r>
+          </a:p>
+          <a:p>
+            <a:pPr lvl="1"/>
             <a:r>
               <a:rPr lang="en-US" dirty="0"/>
-              <a:t> to do list.  Clients input problem areas or share how they are feeling, the app offers yoga postures, meditation, and/or breath work easily incorporated into each day. </a:t>
-            </a:r>
-          </a:p>
-          <a:p>
+              <a:t>So that I can recenter</a:t>
+            </a:r>
+          </a:p>
+          <a:p>
+            <a:pPr lvl="1"/>
             <a:endParaRPr lang="en-US" dirty="0"/>
           </a:p>
           <a:p>
+            <a:pPr marL="0" indent="0">
+              <a:buNone/>
+            </a:pPr>
             <a:r>
               <a:rPr lang="en-US" dirty="0"/>
-              <a:t>Motivation for development – balancing it all is not easy, I think we’re all feeling the crunch.  We wanted to be solution oriented and offer something we could all use…</a:t>
+              <a:t>Motivation for Development:</a:t>
+            </a:r>
+          </a:p>
+          <a:p>
+            <a:pPr lvl="1"/>
+            <a:r>
+              <a:rPr lang="en-US" dirty="0"/>
+              <a:t>Offer a consolidated space to cultivate an at home yoga and meditation practice</a:t>
+            </a:r>
+          </a:p>
+          <a:p>
+            <a:pPr lvl="1"/>
+            <a:r>
+              <a:rPr lang="en-US" dirty="0"/>
+              <a:t>Easy access to local studio info</a:t>
             </a:r>
           </a:p>
           <a:p>
@@ -6204,7 +6248,12 @@
             <p:ph type="title"/>
           </p:nvPr>
         </p:nvSpPr>
-        <p:spPr/>
+        <p:spPr>
+          <a:xfrm>
+            <a:off x="609600" y="3175"/>
+            <a:ext cx="10715625" cy="1325563"/>
+          </a:xfrm>
+        </p:spPr>
         <p:txBody>
           <a:bodyPr/>
           <a:lstStyle/>
@@ -6232,31 +6281,457 @@
             <p:ph idx="1"/>
           </p:nvPr>
         </p:nvSpPr>
-        <p:spPr/>
+        <p:spPr>
+          <a:xfrm>
+            <a:off x="6096000" y="1009650"/>
+            <a:ext cx="5786591" cy="5362577"/>
+          </a:xfrm>
+        </p:spPr>
         <p:txBody>
           <a:bodyPr>
-            <a:normAutofit/>
+            <a:normAutofit fontScale="85000" lnSpcReduction="20000"/>
           </a:bodyPr>
           <a:lstStyle/>
           <a:p>
+            <a:pPr marL="0" indent="0">
+              <a:buNone/>
+            </a:pPr>
             <a:r>
               <a:rPr lang="en-US" dirty="0"/>
-              <a:t>Technologies Used</a:t>
+              <a:t>Challenges:</a:t>
             </a:r>
           </a:p>
           <a:p>
             <a:pPr lvl="1"/>
             <a:r>
               <a:rPr lang="en-US" dirty="0"/>
-              <a:t>Two </a:t>
-            </a:r>
+              <a:t>Viable APIs</a:t>
+            </a:r>
+          </a:p>
+          <a:p>
+            <a:pPr lvl="2"/>
+            <a:r>
+              <a:rPr lang="en-US" dirty="0"/>
+              <a:t>Last FM and Spotify would not  play songs</a:t>
+            </a:r>
+          </a:p>
+          <a:p>
+            <a:pPr lvl="2"/>
+            <a:r>
+              <a:rPr lang="en-US" dirty="0"/>
+              <a:t>Lack of Yoga APIs available</a:t>
+            </a:r>
+          </a:p>
+          <a:p>
+            <a:pPr lvl="2"/>
             <a:r>
               <a:rPr lang="en-US" dirty="0" err="1"/>
-              <a:t>serverside</a:t>
+              <a:t>youTube</a:t>
             </a:r>
             <a:r>
               <a:rPr lang="en-US" dirty="0"/>
-              <a:t> APIs</a:t>
+              <a:t> maxed out in plays per day</a:t>
+            </a:r>
+          </a:p>
+          <a:p>
+            <a:pPr lvl="1"/>
+            <a:r>
+              <a:rPr lang="en-US" dirty="0"/>
+              <a:t>API daily limit expended for calls</a:t>
+            </a:r>
+          </a:p>
+          <a:p>
+            <a:pPr lvl="1"/>
+            <a:r>
+              <a:rPr lang="en-US" dirty="0"/>
+              <a:t>Live sharing VSC did not work</a:t>
+            </a:r>
+          </a:p>
+          <a:p>
+            <a:pPr lvl="1"/>
+            <a:r>
+              <a:rPr lang="en-US" dirty="0"/>
+              <a:t>File size caused issue with pushing to GitHub repo</a:t>
+            </a:r>
+          </a:p>
+          <a:p>
+            <a:pPr lvl="1"/>
+            <a:endParaRPr lang="en-US" dirty="0"/>
+          </a:p>
+          <a:p>
+            <a:pPr marL="0" indent="0">
+              <a:buNone/>
+            </a:pPr>
+            <a:r>
+              <a:rPr lang="en-US" dirty="0"/>
+              <a:t>Successes:</a:t>
+            </a:r>
+          </a:p>
+          <a:p>
+            <a:pPr lvl="1"/>
+            <a:r>
+              <a:rPr lang="en-US" dirty="0"/>
+              <a:t>Great team work</a:t>
+            </a:r>
+          </a:p>
+          <a:p>
+            <a:pPr lvl="1"/>
+            <a:r>
+              <a:rPr lang="en-US" dirty="0"/>
+              <a:t>Adaptability</a:t>
+            </a:r>
+          </a:p>
+          <a:p>
+            <a:pPr lvl="1"/>
+            <a:r>
+              <a:rPr lang="en-US" dirty="0"/>
+              <a:t>Realigned our vision because original scope was not realistic for our timeline</a:t>
+            </a:r>
+          </a:p>
+          <a:p>
+            <a:pPr lvl="1"/>
+            <a:r>
+              <a:rPr lang="en-US" dirty="0"/>
+              <a:t>Adjusted implementation based on current skillsets</a:t>
+            </a:r>
+          </a:p>
+          <a:p>
+            <a:pPr lvl="1"/>
+            <a:r>
+              <a:rPr lang="en-US" dirty="0"/>
+              <a:t>Assigned ideas for future development </a:t>
+            </a:r>
+          </a:p>
+          <a:p>
+            <a:pPr lvl="1"/>
+            <a:endParaRPr lang="en-US" dirty="0"/>
+          </a:p>
+          <a:p>
+            <a:pPr lvl="2"/>
+            <a:endParaRPr lang="en-US" dirty="0"/>
+          </a:p>
+          <a:p>
+            <a:endParaRPr lang="en-US" dirty="0"/>
+          </a:p>
+          <a:p>
+            <a:endParaRPr lang="en-US" dirty="0"/>
+          </a:p>
+          <a:p>
+            <a:endParaRPr lang="en-US" dirty="0"/>
+          </a:p>
+          <a:p>
+            <a:endParaRPr lang="en-US" dirty="0"/>
+          </a:p>
+        </p:txBody>
+      </p:sp>
+      <p:sp>
+        <p:nvSpPr>
+          <p:cNvPr id="4" name="Content Placeholder 2">
+            <a:extLst>
+              <a:ext uri="{FF2B5EF4-FFF2-40B4-BE49-F238E27FC236}">
+                <a16:creationId xmlns:a16="http://schemas.microsoft.com/office/drawing/2014/main" id="{DB05CA3E-CDF6-44B0-94D2-20D76D99F925}"/>
+              </a:ext>
+            </a:extLst>
+          </p:cNvPr>
+          <p:cNvSpPr txBox="1">
+            <a:spLocks/>
+          </p:cNvSpPr>
+          <p:nvPr/>
+        </p:nvSpPr>
+        <p:spPr>
+          <a:xfrm>
+            <a:off x="609600" y="1170040"/>
+            <a:ext cx="4953001" cy="5273624"/>
+          </a:xfrm>
+          <a:prstGeom prst="rect">
+            <a:avLst/>
+          </a:prstGeom>
+        </p:spPr>
+        <p:txBody>
+          <a:bodyPr vert="horz" lIns="91440" tIns="45720" rIns="91440" bIns="45720" rtlCol="0">
+            <a:normAutofit fontScale="92500" lnSpcReduction="10000"/>
+          </a:bodyPr>
+          <a:lstStyle>
+            <a:lvl1pPr marL="228600" indent="-228600" algn="l" defTabSz="914400" rtl="0" eaLnBrk="1" latinLnBrk="0" hangingPunct="1">
+              <a:lnSpc>
+                <a:spcPct val="90000"/>
+              </a:lnSpc>
+              <a:spcBef>
+                <a:spcPts val="1000"/>
+              </a:spcBef>
+              <a:buFont typeface="Arial" panose="020B0604020202020204" pitchFamily="34" charset="0"/>
+              <a:buChar char="•"/>
+              <a:defRPr sz="2800" kern="1200">
+                <a:gradFill>
+                  <a:gsLst>
+                    <a:gs pos="34000">
+                      <a:schemeClr val="tx1">
+                        <a:lumMod val="93000"/>
+                      </a:schemeClr>
+                    </a:gs>
+                    <a:gs pos="0">
+                      <a:schemeClr val="bg1">
+                        <a:lumMod val="25000"/>
+                        <a:lumOff val="75000"/>
+                      </a:schemeClr>
+                    </a:gs>
+                    <a:gs pos="100000">
+                      <a:schemeClr val="tx2">
+                        <a:lumMod val="0"/>
+                        <a:lumOff val="100000"/>
+                      </a:schemeClr>
+                    </a:gs>
+                  </a:gsLst>
+                  <a:lin ang="4800000" scaled="0"/>
+                </a:gradFill>
+                <a:latin typeface="+mn-lt"/>
+                <a:ea typeface="+mn-ea"/>
+                <a:cs typeface="+mn-cs"/>
+              </a:defRPr>
+            </a:lvl1pPr>
+            <a:lvl2pPr marL="685800" indent="-228600" algn="l" defTabSz="914400" rtl="0" eaLnBrk="1" latinLnBrk="0" hangingPunct="1">
+              <a:lnSpc>
+                <a:spcPct val="90000"/>
+              </a:lnSpc>
+              <a:spcBef>
+                <a:spcPts val="500"/>
+              </a:spcBef>
+              <a:buFont typeface="Arial" panose="020B0604020202020204" pitchFamily="34" charset="0"/>
+              <a:buChar char="•"/>
+              <a:defRPr sz="2400" kern="1200">
+                <a:gradFill>
+                  <a:gsLst>
+                    <a:gs pos="34000">
+                      <a:schemeClr val="tx1">
+                        <a:lumMod val="93000"/>
+                      </a:schemeClr>
+                    </a:gs>
+                    <a:gs pos="0">
+                      <a:schemeClr val="bg1">
+                        <a:lumMod val="25000"/>
+                        <a:lumOff val="75000"/>
+                      </a:schemeClr>
+                    </a:gs>
+                    <a:gs pos="100000">
+                      <a:schemeClr val="tx2">
+                        <a:lumMod val="0"/>
+                        <a:lumOff val="100000"/>
+                      </a:schemeClr>
+                    </a:gs>
+                  </a:gsLst>
+                  <a:lin ang="4800000" scaled="0"/>
+                </a:gradFill>
+                <a:latin typeface="+mn-lt"/>
+                <a:ea typeface="+mn-ea"/>
+                <a:cs typeface="+mn-cs"/>
+              </a:defRPr>
+            </a:lvl2pPr>
+            <a:lvl3pPr marL="1143000" indent="-228600" algn="l" defTabSz="914400" rtl="0" eaLnBrk="1" latinLnBrk="0" hangingPunct="1">
+              <a:lnSpc>
+                <a:spcPct val="90000"/>
+              </a:lnSpc>
+              <a:spcBef>
+                <a:spcPts val="500"/>
+              </a:spcBef>
+              <a:buFont typeface="Arial" panose="020B0604020202020204" pitchFamily="34" charset="0"/>
+              <a:buChar char="•"/>
+              <a:defRPr sz="2000" kern="1200">
+                <a:gradFill>
+                  <a:gsLst>
+                    <a:gs pos="34000">
+                      <a:schemeClr val="tx1">
+                        <a:lumMod val="93000"/>
+                      </a:schemeClr>
+                    </a:gs>
+                    <a:gs pos="0">
+                      <a:schemeClr val="bg1">
+                        <a:lumMod val="25000"/>
+                        <a:lumOff val="75000"/>
+                      </a:schemeClr>
+                    </a:gs>
+                    <a:gs pos="100000">
+                      <a:schemeClr val="tx2">
+                        <a:lumMod val="0"/>
+                        <a:lumOff val="100000"/>
+                      </a:schemeClr>
+                    </a:gs>
+                  </a:gsLst>
+                  <a:lin ang="4800000" scaled="0"/>
+                </a:gradFill>
+                <a:latin typeface="+mn-lt"/>
+                <a:ea typeface="+mn-ea"/>
+                <a:cs typeface="+mn-cs"/>
+              </a:defRPr>
+            </a:lvl3pPr>
+            <a:lvl4pPr marL="1600200" indent="-228600" algn="l" defTabSz="914400" rtl="0" eaLnBrk="1" latinLnBrk="0" hangingPunct="1">
+              <a:lnSpc>
+                <a:spcPct val="90000"/>
+              </a:lnSpc>
+              <a:spcBef>
+                <a:spcPts val="500"/>
+              </a:spcBef>
+              <a:buFont typeface="Arial" panose="020B0604020202020204" pitchFamily="34" charset="0"/>
+              <a:buChar char="•"/>
+              <a:defRPr sz="1800" kern="1200">
+                <a:gradFill>
+                  <a:gsLst>
+                    <a:gs pos="34000">
+                      <a:schemeClr val="tx1">
+                        <a:lumMod val="93000"/>
+                      </a:schemeClr>
+                    </a:gs>
+                    <a:gs pos="0">
+                      <a:schemeClr val="bg1">
+                        <a:lumMod val="25000"/>
+                        <a:lumOff val="75000"/>
+                      </a:schemeClr>
+                    </a:gs>
+                    <a:gs pos="100000">
+                      <a:schemeClr val="tx2">
+                        <a:lumMod val="0"/>
+                        <a:lumOff val="100000"/>
+                      </a:schemeClr>
+                    </a:gs>
+                  </a:gsLst>
+                  <a:lin ang="4800000" scaled="0"/>
+                </a:gradFill>
+                <a:latin typeface="+mn-lt"/>
+                <a:ea typeface="+mn-ea"/>
+                <a:cs typeface="+mn-cs"/>
+              </a:defRPr>
+            </a:lvl4pPr>
+            <a:lvl5pPr marL="2057400" indent="-228600" algn="l" defTabSz="914400" rtl="0" eaLnBrk="1" latinLnBrk="0" hangingPunct="1">
+              <a:lnSpc>
+                <a:spcPct val="90000"/>
+              </a:lnSpc>
+              <a:spcBef>
+                <a:spcPts val="500"/>
+              </a:spcBef>
+              <a:buFont typeface="Arial" panose="020B0604020202020204" pitchFamily="34" charset="0"/>
+              <a:buChar char="•"/>
+              <a:defRPr sz="1800" kern="1200">
+                <a:gradFill>
+                  <a:gsLst>
+                    <a:gs pos="34000">
+                      <a:schemeClr val="tx1">
+                        <a:lumMod val="93000"/>
+                      </a:schemeClr>
+                    </a:gs>
+                    <a:gs pos="0">
+                      <a:schemeClr val="bg1">
+                        <a:lumMod val="25000"/>
+                        <a:lumOff val="75000"/>
+                      </a:schemeClr>
+                    </a:gs>
+                    <a:gs pos="100000">
+                      <a:schemeClr val="tx2">
+                        <a:lumMod val="0"/>
+                        <a:lumOff val="100000"/>
+                      </a:schemeClr>
+                    </a:gs>
+                  </a:gsLst>
+                  <a:lin ang="4800000" scaled="0"/>
+                </a:gradFill>
+                <a:latin typeface="+mn-lt"/>
+                <a:ea typeface="+mn-ea"/>
+                <a:cs typeface="+mn-cs"/>
+              </a:defRPr>
+            </a:lvl5pPr>
+            <a:lvl6pPr marL="2514600" indent="-228600" algn="l" defTabSz="914400" rtl="0" eaLnBrk="1" latinLnBrk="0" hangingPunct="1">
+              <a:lnSpc>
+                <a:spcPct val="90000"/>
+              </a:lnSpc>
+              <a:spcBef>
+                <a:spcPts val="500"/>
+              </a:spcBef>
+              <a:buFont typeface="Arial" panose="020B0604020202020204" pitchFamily="34" charset="0"/>
+              <a:buChar char="•"/>
+              <a:defRPr sz="1800" kern="1200">
+                <a:solidFill>
+                  <a:schemeClr val="tx1"/>
+                </a:solidFill>
+                <a:latin typeface="+mn-lt"/>
+                <a:ea typeface="+mn-ea"/>
+                <a:cs typeface="+mn-cs"/>
+              </a:defRPr>
+            </a:lvl6pPr>
+            <a:lvl7pPr marL="2971800" indent="-228600" algn="l" defTabSz="914400" rtl="0" eaLnBrk="1" latinLnBrk="0" hangingPunct="1">
+              <a:lnSpc>
+                <a:spcPct val="90000"/>
+              </a:lnSpc>
+              <a:spcBef>
+                <a:spcPts val="500"/>
+              </a:spcBef>
+              <a:buFont typeface="Arial" panose="020B0604020202020204" pitchFamily="34" charset="0"/>
+              <a:buChar char="•"/>
+              <a:defRPr sz="1800" kern="1200">
+                <a:solidFill>
+                  <a:schemeClr val="tx1"/>
+                </a:solidFill>
+                <a:latin typeface="+mn-lt"/>
+                <a:ea typeface="+mn-ea"/>
+                <a:cs typeface="+mn-cs"/>
+              </a:defRPr>
+            </a:lvl7pPr>
+            <a:lvl8pPr marL="3429000" indent="-228600" algn="l" defTabSz="914400" rtl="0" eaLnBrk="1" latinLnBrk="0" hangingPunct="1">
+              <a:lnSpc>
+                <a:spcPct val="90000"/>
+              </a:lnSpc>
+              <a:spcBef>
+                <a:spcPts val="500"/>
+              </a:spcBef>
+              <a:buFont typeface="Arial" panose="020B0604020202020204" pitchFamily="34" charset="0"/>
+              <a:buChar char="•"/>
+              <a:defRPr sz="1800" kern="1200">
+                <a:solidFill>
+                  <a:schemeClr val="tx1"/>
+                </a:solidFill>
+                <a:latin typeface="+mn-lt"/>
+                <a:ea typeface="+mn-ea"/>
+                <a:cs typeface="+mn-cs"/>
+              </a:defRPr>
+            </a:lvl8pPr>
+            <a:lvl9pPr marL="3886200" indent="-228600" algn="l" defTabSz="914400" rtl="0" eaLnBrk="1" latinLnBrk="0" hangingPunct="1">
+              <a:lnSpc>
+                <a:spcPct val="90000"/>
+              </a:lnSpc>
+              <a:spcBef>
+                <a:spcPts val="500"/>
+              </a:spcBef>
+              <a:buFont typeface="Arial" panose="020B0604020202020204" pitchFamily="34" charset="0"/>
+              <a:buChar char="•"/>
+              <a:defRPr sz="1800" kern="1200">
+                <a:solidFill>
+                  <a:schemeClr val="tx1"/>
+                </a:solidFill>
+                <a:latin typeface="+mn-lt"/>
+                <a:ea typeface="+mn-ea"/>
+                <a:cs typeface="+mn-cs"/>
+              </a:defRPr>
+            </a:lvl9pPr>
+          </a:lstStyle>
+          <a:p>
+            <a:pPr marL="0" indent="0">
+              <a:buFont typeface="Arial" panose="020B0604020202020204" pitchFamily="34" charset="0"/>
+              <a:buNone/>
+            </a:pPr>
+            <a:r>
+              <a:rPr lang="en-US" dirty="0"/>
+              <a:t>Technologies Used:</a:t>
+            </a:r>
+          </a:p>
+          <a:p>
+            <a:pPr lvl="1"/>
+            <a:r>
+              <a:rPr lang="en-US" dirty="0"/>
+              <a:t>HTML, jQuery, JavaScript, CSS</a:t>
+            </a:r>
+          </a:p>
+          <a:p>
+            <a:pPr lvl="1"/>
+            <a:r>
+              <a:rPr lang="en-US" dirty="0"/>
+              <a:t>Two server side APIs</a:t>
             </a:r>
           </a:p>
           <a:p>
@@ -6285,30 +6760,59 @@
             <a:endParaRPr lang="en-US" dirty="0"/>
           </a:p>
           <a:p>
+            <a:pPr marL="0" indent="0">
+              <a:buFont typeface="Arial" panose="020B0604020202020204" pitchFamily="34" charset="0"/>
+              <a:buNone/>
+            </a:pPr>
             <a:r>
               <a:rPr lang="en-US" dirty="0"/>
-              <a:t>Breakdown of tasks and roles</a:t>
-            </a:r>
-          </a:p>
-          <a:p>
+              <a:t>Tasks/Roles:</a:t>
+            </a:r>
+          </a:p>
+          <a:p>
+            <a:pPr lvl="1"/>
             <a:r>
               <a:rPr lang="en-US" dirty="0"/>
-              <a:t>Challenges we encountered – APIs…………………..</a:t>
-            </a:r>
-          </a:p>
-          <a:p>
+              <a:t>Identified project scope</a:t>
+            </a:r>
+          </a:p>
+          <a:p>
+            <a:pPr lvl="1"/>
             <a:r>
               <a:rPr lang="en-US" dirty="0"/>
-              <a:t>Successes – great team work, we learned from </a:t>
-            </a:r>
-            <a:r>
-              <a:rPr lang="en-US" dirty="0" err="1"/>
-              <a:t>eachother</a:t>
-            </a:r>
+              <a:t>Searched for viable APIs</a:t>
+            </a:r>
+          </a:p>
+          <a:p>
+            <a:pPr lvl="1"/>
             <a:r>
               <a:rPr lang="en-US" dirty="0"/>
-              <a:t>….</a:t>
-            </a:r>
+              <a:t>Outlined the layout of the app</a:t>
+            </a:r>
+          </a:p>
+          <a:p>
+            <a:pPr lvl="1"/>
+            <a:r>
+              <a:rPr lang="en-US" dirty="0"/>
+              <a:t>Pseudocode ideas and functionality</a:t>
+            </a:r>
+          </a:p>
+          <a:p>
+            <a:pPr lvl="1"/>
+            <a:r>
+              <a:rPr lang="en-US" dirty="0"/>
+              <a:t>Worked together to discuss and research as a group during class time</a:t>
+            </a:r>
+          </a:p>
+          <a:p>
+            <a:pPr marL="457200" lvl="1" indent="0">
+              <a:buNone/>
+            </a:pPr>
+            <a:endParaRPr lang="en-US" dirty="0"/>
+          </a:p>
+          <a:p>
+            <a:pPr lvl="2"/>
+            <a:endParaRPr lang="en-US" dirty="0"/>
           </a:p>
           <a:p>
             <a:endParaRPr lang="en-US" dirty="0"/>
@@ -6561,18 +7065,28 @@
           <a:p>
             <a:r>
               <a:rPr lang="en-US" dirty="0"/>
+              <a:t>Music linked to specific poses</a:t>
+            </a:r>
+          </a:p>
+          <a:p>
+            <a:r>
+              <a:rPr lang="en-US" dirty="0"/>
               <a:t>Visual breath queues</a:t>
             </a:r>
           </a:p>
           <a:p>
             <a:r>
               <a:rPr lang="en-US" dirty="0"/>
-              <a:t>Essential Oil &amp; Candle Scent </a:t>
-            </a:r>
-            <a:r>
-              <a:rPr lang="en-US" dirty="0" err="1"/>
-              <a:t>Pairin</a:t>
-            </a:r>
+              <a:t>Essential Oil &amp; Candle Scent Pairing</a:t>
+            </a:r>
+          </a:p>
+          <a:p>
+            <a:r>
+              <a:rPr lang="en-US" dirty="0"/>
+              <a:t>Yoga Search – yield more than one option to pick from</a:t>
+            </a:r>
+          </a:p>
+          <a:p>
             <a:endParaRPr lang="en-US" dirty="0"/>
           </a:p>
           <a:p>
@@ -6629,14 +7143,19 @@
             <p:ph type="title"/>
           </p:nvPr>
         </p:nvSpPr>
-        <p:spPr/>
+        <p:spPr>
+          <a:xfrm>
+            <a:off x="428625" y="203200"/>
+            <a:ext cx="10515600" cy="1325563"/>
+          </a:xfrm>
+        </p:spPr>
         <p:txBody>
           <a:bodyPr/>
           <a:lstStyle/>
           <a:p>
             <a:r>
               <a:rPr lang="en-US" dirty="0"/>
-              <a:t>Links</a:t>
+              <a:t>Check Us Out</a:t>
             </a:r>
           </a:p>
         </p:txBody>
@@ -6657,11 +7176,19 @@
             <p:ph idx="1"/>
           </p:nvPr>
         </p:nvSpPr>
-        <p:spPr/>
-        <p:txBody>
-          <a:bodyPr/>
-          <a:lstStyle/>
-          <a:p>
+        <p:spPr>
+          <a:xfrm>
+            <a:off x="428625" y="1825625"/>
+            <a:ext cx="10925175" cy="4351338"/>
+          </a:xfrm>
+        </p:spPr>
+        <p:txBody>
+          <a:bodyPr/>
+          <a:lstStyle/>
+          <a:p>
+            <a:pPr marL="0" indent="0">
+              <a:buNone/>
+            </a:pPr>
             <a:r>
               <a:rPr lang="en-US" dirty="0"/>
               <a:t>Deployed Site - </a:t>
@@ -6678,6 +7205,9 @@
             <a:endParaRPr lang="en-US" dirty="0"/>
           </a:p>
           <a:p>
+            <a:pPr marL="0" indent="0">
+              <a:buNone/>
+            </a:pPr>
             <a:r>
               <a:rPr lang="en-US" dirty="0"/>
               <a:t>GitHub Repo - </a:t>

</xml_diff>